<commit_message>
Removed old font + new icons
</commit_message>
<xml_diff>
--- a/Afis.pptx
+++ b/Afis.pptx
@@ -243,7 +243,7 @@
           <a:p>
             <a:fld id="{8D70C389-B10F-4122-8102-69D194FED55B}" type="datetimeFigureOut">
               <a:rPr lang="en-US" smtClean="0"/>
-              <a:t>5/19/2024</a:t>
+              <a:t>5/20/2024</a:t>
             </a:fld>
             <a:endParaRPr lang="en-US"/>
           </a:p>
@@ -413,7 +413,7 @@
           <a:p>
             <a:fld id="{8D70C389-B10F-4122-8102-69D194FED55B}" type="datetimeFigureOut">
               <a:rPr lang="en-US" smtClean="0"/>
-              <a:t>5/19/2024</a:t>
+              <a:t>5/20/2024</a:t>
             </a:fld>
             <a:endParaRPr lang="en-US"/>
           </a:p>
@@ -593,7 +593,7 @@
           <a:p>
             <a:fld id="{8D70C389-B10F-4122-8102-69D194FED55B}" type="datetimeFigureOut">
               <a:rPr lang="en-US" smtClean="0"/>
-              <a:t>5/19/2024</a:t>
+              <a:t>5/20/2024</a:t>
             </a:fld>
             <a:endParaRPr lang="en-US"/>
           </a:p>
@@ -763,7 +763,7 @@
           <a:p>
             <a:fld id="{8D70C389-B10F-4122-8102-69D194FED55B}" type="datetimeFigureOut">
               <a:rPr lang="en-US" smtClean="0"/>
-              <a:t>5/19/2024</a:t>
+              <a:t>5/20/2024</a:t>
             </a:fld>
             <a:endParaRPr lang="en-US"/>
           </a:p>
@@ -1007,7 +1007,7 @@
           <a:p>
             <a:fld id="{8D70C389-B10F-4122-8102-69D194FED55B}" type="datetimeFigureOut">
               <a:rPr lang="en-US" smtClean="0"/>
-              <a:t>5/19/2024</a:t>
+              <a:t>5/20/2024</a:t>
             </a:fld>
             <a:endParaRPr lang="en-US"/>
           </a:p>
@@ -1239,7 +1239,7 @@
           <a:p>
             <a:fld id="{8D70C389-B10F-4122-8102-69D194FED55B}" type="datetimeFigureOut">
               <a:rPr lang="en-US" smtClean="0"/>
-              <a:t>5/19/2024</a:t>
+              <a:t>5/20/2024</a:t>
             </a:fld>
             <a:endParaRPr lang="en-US"/>
           </a:p>
@@ -1606,7 +1606,7 @@
           <a:p>
             <a:fld id="{8D70C389-B10F-4122-8102-69D194FED55B}" type="datetimeFigureOut">
               <a:rPr lang="en-US" smtClean="0"/>
-              <a:t>5/19/2024</a:t>
+              <a:t>5/20/2024</a:t>
             </a:fld>
             <a:endParaRPr lang="en-US"/>
           </a:p>
@@ -1724,7 +1724,7 @@
           <a:p>
             <a:fld id="{8D70C389-B10F-4122-8102-69D194FED55B}" type="datetimeFigureOut">
               <a:rPr lang="en-US" smtClean="0"/>
-              <a:t>5/19/2024</a:t>
+              <a:t>5/20/2024</a:t>
             </a:fld>
             <a:endParaRPr lang="en-US"/>
           </a:p>
@@ -1819,7 +1819,7 @@
           <a:p>
             <a:fld id="{8D70C389-B10F-4122-8102-69D194FED55B}" type="datetimeFigureOut">
               <a:rPr lang="en-US" smtClean="0"/>
-              <a:t>5/19/2024</a:t>
+              <a:t>5/20/2024</a:t>
             </a:fld>
             <a:endParaRPr lang="en-US"/>
           </a:p>
@@ -2096,7 +2096,7 @@
           <a:p>
             <a:fld id="{8D70C389-B10F-4122-8102-69D194FED55B}" type="datetimeFigureOut">
               <a:rPr lang="en-US" smtClean="0"/>
-              <a:t>5/19/2024</a:t>
+              <a:t>5/20/2024</a:t>
             </a:fld>
             <a:endParaRPr lang="en-US"/>
           </a:p>
@@ -2353,7 +2353,7 @@
           <a:p>
             <a:fld id="{8D70C389-B10F-4122-8102-69D194FED55B}" type="datetimeFigureOut">
               <a:rPr lang="en-US" smtClean="0"/>
-              <a:t>5/19/2024</a:t>
+              <a:t>5/20/2024</a:t>
             </a:fld>
             <a:endParaRPr lang="en-US"/>
           </a:p>
@@ -2566,7 +2566,7 @@
           <a:p>
             <a:fld id="{8D70C389-B10F-4122-8102-69D194FED55B}" type="datetimeFigureOut">
               <a:rPr lang="en-US" smtClean="0"/>
-              <a:t>5/19/2024</a:t>
+              <a:t>5/20/2024</a:t>
             </a:fld>
             <a:endParaRPr lang="en-US"/>
           </a:p>
@@ -2993,8 +2993,8 @@
         </p:nvSpPr>
         <p:spPr>
           <a:xfrm rot="21010892">
-            <a:off x="42982" y="590689"/>
-            <a:ext cx="5881215" cy="1631216"/>
+            <a:off x="31106" y="606310"/>
+            <a:ext cx="7502862" cy="1323439"/>
           </a:xfrm>
           <a:prstGeom prst="rect">
             <a:avLst/>
@@ -3281,16 +3281,286 @@
           <a:lstStyle/>
           <a:p>
             <a:pPr algn="ctr"/>
-            <a:endParaRPr lang="en-US"/>
+            <a:endParaRPr lang="en-US" dirty="0"/>
+          </a:p>
+        </p:txBody>
+      </p:sp>
+      <p:grpSp>
+        <p:nvGrpSpPr>
+          <p:cNvPr id="36" name="Group 35">
+            <a:extLst>
+              <a:ext uri="{FF2B5EF4-FFF2-40B4-BE49-F238E27FC236}">
+                <a16:creationId xmlns:a16="http://schemas.microsoft.com/office/drawing/2014/main" id="{8A1AD531-DA61-6F9D-968D-D4F79BE8C40A}"/>
+              </a:ext>
+            </a:extLst>
+          </p:cNvPr>
+          <p:cNvGrpSpPr/>
+          <p:nvPr/>
+        </p:nvGrpSpPr>
+        <p:grpSpPr>
+          <a:xfrm>
+            <a:off x="425426" y="6438112"/>
+            <a:ext cx="11876726" cy="3141463"/>
+            <a:chOff x="425426" y="6438112"/>
+            <a:chExt cx="11876726" cy="3141463"/>
+          </a:xfrm>
+        </p:grpSpPr>
+        <p:sp>
+          <p:nvSpPr>
+            <p:cNvPr id="2" name="TextBox 1">
+              <a:extLst>
+                <a:ext uri="{FF2B5EF4-FFF2-40B4-BE49-F238E27FC236}">
+                  <a16:creationId xmlns:a16="http://schemas.microsoft.com/office/drawing/2014/main" id="{121E178F-7137-815E-641E-B54FDDA0A449}"/>
+                </a:ext>
+              </a:extLst>
+            </p:cNvPr>
+            <p:cNvSpPr txBox="1"/>
+            <p:nvPr/>
+          </p:nvSpPr>
+          <p:spPr>
+            <a:xfrm>
+              <a:off x="425426" y="6871141"/>
+              <a:ext cx="10231682" cy="2708434"/>
+            </a:xfrm>
+            <a:prstGeom prst="rect">
+              <a:avLst/>
+            </a:prstGeom>
+            <a:noFill/>
+            <a:effectLst/>
+          </p:spPr>
+          <p:txBody>
+            <a:bodyPr wrap="square" rtlCol="0">
+              <a:spAutoFit/>
+            </a:bodyPr>
+            <a:lstStyle/>
+            <a:p>
+              <a:r>
+                <a:rPr lang="ro-RO" sz="17000" dirty="0">
+                  <a:solidFill>
+                    <a:srgbClr val="FFE79B"/>
+                  </a:solidFill>
+                  <a:effectLst>
+                    <a:outerShdw blurRad="38100" dist="38100" dir="2700000" algn="tl">
+                      <a:srgbClr val="000000">
+                        <a:alpha val="43137"/>
+                      </a:srgbClr>
+                    </a:outerShdw>
+                  </a:effectLst>
+                  <a:latin typeface="Suez One" panose="00000500000000000000" pitchFamily="2" charset="-79"/>
+                  <a:cs typeface="Suez One" panose="00000500000000000000" pitchFamily="2" charset="-79"/>
+                </a:rPr>
+                <a:t>Kerweih</a:t>
+              </a:r>
+              <a:endParaRPr lang="en-US" sz="17000" dirty="0">
+                <a:solidFill>
+                  <a:srgbClr val="FFE79B"/>
+                </a:solidFill>
+                <a:effectLst>
+                  <a:outerShdw blurRad="38100" dist="38100" dir="2700000" algn="tl">
+                    <a:srgbClr val="000000">
+                      <a:alpha val="43137"/>
+                    </a:srgbClr>
+                  </a:outerShdw>
+                </a:effectLst>
+                <a:latin typeface="Suez One" panose="00000500000000000000" pitchFamily="2" charset="-79"/>
+                <a:cs typeface="Suez One" panose="00000500000000000000" pitchFamily="2" charset="-79"/>
+              </a:endParaRPr>
+            </a:p>
+          </p:txBody>
+        </p:sp>
+        <p:sp>
+          <p:nvSpPr>
+            <p:cNvPr id="3" name="TextBox 2">
+              <a:extLst>
+                <a:ext uri="{FF2B5EF4-FFF2-40B4-BE49-F238E27FC236}">
+                  <a16:creationId xmlns:a16="http://schemas.microsoft.com/office/drawing/2014/main" id="{A147DE8D-D8E3-41A3-E1BF-0395310EA1EB}"/>
+                </a:ext>
+              </a:extLst>
+            </p:cNvPr>
+            <p:cNvSpPr txBox="1"/>
+            <p:nvPr/>
+          </p:nvSpPr>
+          <p:spPr>
+            <a:xfrm>
+              <a:off x="2070470" y="6438112"/>
+              <a:ext cx="10231682" cy="1323439"/>
+            </a:xfrm>
+            <a:prstGeom prst="rect">
+              <a:avLst/>
+            </a:prstGeom>
+            <a:noFill/>
+          </p:spPr>
+          <p:txBody>
+            <a:bodyPr wrap="square" rtlCol="0">
+              <a:spAutoFit/>
+            </a:bodyPr>
+            <a:lstStyle/>
+            <a:p>
+              <a:r>
+                <a:rPr lang="ro-RO" sz="8000" dirty="0">
+                  <a:solidFill>
+                    <a:srgbClr val="FFE79B"/>
+                  </a:solidFill>
+                  <a:effectLst>
+                    <a:outerShdw blurRad="38100" dist="38100" dir="2700000" algn="tl">
+                      <a:srgbClr val="000000">
+                        <a:alpha val="43137"/>
+                      </a:srgbClr>
+                    </a:outerShdw>
+                  </a:effectLst>
+                  <a:latin typeface="Suez One" panose="00000500000000000000" pitchFamily="2" charset="-79"/>
+                  <a:cs typeface="Suez One" panose="00000500000000000000" pitchFamily="2" charset="-79"/>
+                </a:rPr>
+                <a:t>Lowriner</a:t>
+              </a:r>
+              <a:endParaRPr lang="en-US" sz="8000" dirty="0">
+                <a:solidFill>
+                  <a:srgbClr val="FFE79B"/>
+                </a:solidFill>
+                <a:effectLst>
+                  <a:outerShdw blurRad="38100" dist="38100" dir="2700000" algn="tl">
+                    <a:srgbClr val="000000">
+                      <a:alpha val="43137"/>
+                    </a:srgbClr>
+                  </a:outerShdw>
+                </a:effectLst>
+                <a:latin typeface="Suez One" panose="00000500000000000000" pitchFamily="2" charset="-79"/>
+                <a:cs typeface="Suez One" panose="00000500000000000000" pitchFamily="2" charset="-79"/>
+              </a:endParaRPr>
+            </a:p>
+          </p:txBody>
+        </p:sp>
+      </p:grpSp>
+      <p:sp>
+        <p:nvSpPr>
+          <p:cNvPr id="4" name="TextBox 3">
+            <a:extLst>
+              <a:ext uri="{FF2B5EF4-FFF2-40B4-BE49-F238E27FC236}">
+                <a16:creationId xmlns:a16="http://schemas.microsoft.com/office/drawing/2014/main" id="{9A3CA178-BB23-CF5F-2705-2C8213C273DF}"/>
+              </a:ext>
+            </a:extLst>
+          </p:cNvPr>
+          <p:cNvSpPr txBox="1"/>
+          <p:nvPr/>
+        </p:nvSpPr>
+        <p:spPr>
+          <a:xfrm>
+            <a:off x="4365785" y="9082721"/>
+            <a:ext cx="5875495" cy="923330"/>
+          </a:xfrm>
+          <a:prstGeom prst="rect">
+            <a:avLst/>
+          </a:prstGeom>
+          <a:noFill/>
+        </p:spPr>
+        <p:txBody>
+          <a:bodyPr wrap="square" rtlCol="0">
+            <a:spAutoFit/>
+          </a:bodyPr>
+          <a:lstStyle/>
+          <a:p>
+            <a:r>
+              <a:rPr lang="ro-RO" sz="5400" dirty="0">
+                <a:solidFill>
+                  <a:srgbClr val="FFE79B"/>
+                </a:solidFill>
+                <a:effectLst>
+                  <a:outerShdw blurRad="38100" dist="38100" dir="2700000" algn="tl">
+                    <a:srgbClr val="000000">
+                      <a:alpha val="43137"/>
+                    </a:srgbClr>
+                  </a:outerShdw>
+                </a:effectLst>
+                <a:latin typeface="Suez One" panose="00000500000000000000" pitchFamily="2" charset="-79"/>
+                <a:cs typeface="Suez One" panose="00000500000000000000" pitchFamily="2" charset="-79"/>
+              </a:rPr>
+              <a:t>03.08.2024</a:t>
+            </a:r>
+            <a:endParaRPr lang="en-US" sz="5400" dirty="0">
+              <a:solidFill>
+                <a:srgbClr val="FFE79B"/>
+              </a:solidFill>
+              <a:effectLst>
+                <a:outerShdw blurRad="38100" dist="38100" dir="2700000" algn="tl">
+                  <a:srgbClr val="000000">
+                    <a:alpha val="43137"/>
+                  </a:srgbClr>
+                </a:outerShdw>
+              </a:effectLst>
+              <a:latin typeface="Suez One" panose="00000500000000000000" pitchFamily="2" charset="-79"/>
+              <a:cs typeface="Suez One" panose="00000500000000000000" pitchFamily="2" charset="-79"/>
+            </a:endParaRPr>
+          </a:p>
+        </p:txBody>
+      </p:sp>
+      <p:sp>
+        <p:nvSpPr>
+          <p:cNvPr id="5" name="TextBox 4">
+            <a:extLst>
+              <a:ext uri="{FF2B5EF4-FFF2-40B4-BE49-F238E27FC236}">
+                <a16:creationId xmlns:a16="http://schemas.microsoft.com/office/drawing/2014/main" id="{42A0CE11-CF25-C229-BC3A-9624216A6CCF}"/>
+              </a:ext>
+            </a:extLst>
+          </p:cNvPr>
+          <p:cNvSpPr txBox="1"/>
+          <p:nvPr/>
+        </p:nvSpPr>
+        <p:spPr>
+          <a:xfrm>
+            <a:off x="876859" y="4802352"/>
+            <a:ext cx="10231682" cy="553998"/>
+          </a:xfrm>
+          <a:prstGeom prst="rect">
+            <a:avLst/>
+          </a:prstGeom>
+          <a:noFill/>
+        </p:spPr>
+        <p:txBody>
+          <a:bodyPr wrap="square" rtlCol="0">
+            <a:spAutoFit/>
+          </a:bodyPr>
+          <a:lstStyle/>
+          <a:p>
+            <a:r>
+              <a:rPr lang="ro-RO" sz="3000" b="1" dirty="0">
+                <a:solidFill>
+                  <a:srgbClr val="FFE79B"/>
+                </a:solidFill>
+                <a:effectLst>
+                  <a:outerShdw blurRad="63500" sx="102000" sy="102000" algn="ctr" rotWithShape="0">
+                    <a:prstClr val="black">
+                      <a:alpha val="30000"/>
+                    </a:prstClr>
+                  </a:outerShdw>
+                </a:effectLst>
+                <a:latin typeface="PT Serif" panose="020A0603040505020204" pitchFamily="18" charset="0"/>
+                <a:cs typeface="Times New Roman" panose="02020603050405020304" pitchFamily="18" charset="0"/>
+              </a:rPr>
+              <a:t>Căminul Cultural Lovrin</a:t>
+            </a:r>
+            <a:endParaRPr lang="en-US" sz="3000" b="1" dirty="0">
+              <a:solidFill>
+                <a:srgbClr val="FFE79B"/>
+              </a:solidFill>
+              <a:effectLst>
+                <a:outerShdw blurRad="63500" sx="102000" sy="102000" algn="ctr" rotWithShape="0">
+                  <a:prstClr val="black">
+                    <a:alpha val="30000"/>
+                  </a:prstClr>
+                </a:outerShdw>
+              </a:effectLst>
+              <a:latin typeface="PT Serif" panose="020A0603040505020204" pitchFamily="18" charset="0"/>
+              <a:cs typeface="Times New Roman" panose="02020603050405020304" pitchFamily="18" charset="0"/>
+            </a:endParaRPr>
           </a:p>
         </p:txBody>
       </p:sp>
       <p:pic>
         <p:nvPicPr>
-          <p:cNvPr id="20" name="Picture 19">
+          <p:cNvPr id="9" name="Picture 8">
             <a:extLst>
               <a:ext uri="{FF2B5EF4-FFF2-40B4-BE49-F238E27FC236}">
-                <a16:creationId xmlns:a16="http://schemas.microsoft.com/office/drawing/2014/main" id="{D3360B39-7EC2-ABEA-7AD5-92D6455E0BC9}"/>
+                <a16:creationId xmlns:a16="http://schemas.microsoft.com/office/drawing/2014/main" id="{96981860-2647-7091-FCA6-8CC423EB8B85}"/>
               </a:ext>
             </a:extLst>
           </p:cNvPr>
@@ -3313,8 +3583,8 @@
         </p:blipFill>
         <p:spPr>
           <a:xfrm>
-            <a:off x="238201" y="11624754"/>
-            <a:ext cx="804672" cy="804672"/>
+            <a:off x="302907" y="4796764"/>
+            <a:ext cx="553998" cy="553998"/>
           </a:xfrm>
           <a:prstGeom prst="rect">
             <a:avLst/>
@@ -3323,10 +3593,10 @@
       </p:pic>
       <p:pic>
         <p:nvPicPr>
-          <p:cNvPr id="18" name="Picture 17">
+          <p:cNvPr id="11" name="Picture 10">
             <a:extLst>
               <a:ext uri="{FF2B5EF4-FFF2-40B4-BE49-F238E27FC236}">
-                <a16:creationId xmlns:a16="http://schemas.microsoft.com/office/drawing/2014/main" id="{2E6DE1C6-BB1D-E360-A587-2CC859F542E6}"/>
+                <a16:creationId xmlns:a16="http://schemas.microsoft.com/office/drawing/2014/main" id="{8BC1E183-DCAB-B394-1579-F8BA67B627C7}"/>
               </a:ext>
             </a:extLst>
           </p:cNvPr>
@@ -3349,8 +3619,8 @@
         </p:blipFill>
         <p:spPr>
           <a:xfrm>
-            <a:off x="3797038" y="11417434"/>
-            <a:ext cx="804672" cy="988825"/>
+            <a:off x="360461" y="5532352"/>
+            <a:ext cx="438027" cy="438027"/>
           </a:xfrm>
           <a:prstGeom prst="rect">
             <a:avLst/>
@@ -3359,10 +3629,10 @@
       </p:pic>
       <p:sp>
         <p:nvSpPr>
-          <p:cNvPr id="22" name="TextBox 21">
+          <p:cNvPr id="12" name="TextBox 11">
             <a:extLst>
               <a:ext uri="{FF2B5EF4-FFF2-40B4-BE49-F238E27FC236}">
-                <a16:creationId xmlns:a16="http://schemas.microsoft.com/office/drawing/2014/main" id="{BC3B032A-6D24-1F6C-98B1-4FA81D958E00}"/>
+                <a16:creationId xmlns:a16="http://schemas.microsoft.com/office/drawing/2014/main" id="{7BADC1A9-C904-5E13-73C6-2D00701B5690}"/>
               </a:ext>
             </a:extLst>
           </p:cNvPr>
@@ -3371,444 +3641,8 @@
         </p:nvSpPr>
         <p:spPr>
           <a:xfrm>
-            <a:off x="988008" y="11637463"/>
-            <a:ext cx="3071928" cy="738664"/>
-          </a:xfrm>
-          <a:prstGeom prst="rect">
-            <a:avLst/>
-          </a:prstGeom>
-          <a:noFill/>
-        </p:spPr>
-        <p:txBody>
-          <a:bodyPr wrap="square" rtlCol="0">
-            <a:spAutoFit/>
-          </a:bodyPr>
-          <a:lstStyle/>
-          <a:p>
-            <a:r>
-              <a:rPr lang="ro-RO" sz="1400" b="1" dirty="0">
-                <a:solidFill>
-                  <a:srgbClr val="FFE79B"/>
-                </a:solidFill>
-                <a:effectLst>
-                  <a:outerShdw blurRad="63500" sx="102000" sy="102000" algn="ctr" rotWithShape="0">
-                    <a:prstClr val="black">
-                      <a:alpha val="30000"/>
-                    </a:prstClr>
-                  </a:outerShdw>
-                </a:effectLst>
-                <a:latin typeface="PT Serif" panose="020A0603040505020204" pitchFamily="18" charset="0"/>
-                <a:cs typeface="Times New Roman" panose="02020603050405020304" pitchFamily="18" charset="0"/>
-              </a:rPr>
-              <a:t>Heimatortsgemeinschaft Lovrin</a:t>
-            </a:r>
-          </a:p>
-          <a:p>
-            <a:r>
-              <a:rPr lang="ro-RO" sz="1400" b="1" dirty="0">
-                <a:solidFill>
-                  <a:srgbClr val="FFE79B"/>
-                </a:solidFill>
-                <a:effectLst>
-                  <a:outerShdw blurRad="63500" sx="102000" sy="102000" algn="ctr" rotWithShape="0">
-                    <a:prstClr val="black">
-                      <a:alpha val="30000"/>
-                    </a:prstClr>
-                  </a:outerShdw>
-                </a:effectLst>
-                <a:latin typeface="PT Serif" panose="020A0603040505020204" pitchFamily="18" charset="0"/>
-                <a:cs typeface="Times New Roman" panose="02020603050405020304" pitchFamily="18" charset="0"/>
-              </a:rPr>
-              <a:t>in der Landsmannschaft</a:t>
-            </a:r>
-          </a:p>
-          <a:p>
-            <a:r>
-              <a:rPr lang="ro-RO" sz="1400" b="1" dirty="0">
-                <a:solidFill>
-                  <a:srgbClr val="FFE79B"/>
-                </a:solidFill>
-                <a:effectLst>
-                  <a:outerShdw blurRad="63500" sx="102000" sy="102000" algn="ctr" rotWithShape="0">
-                    <a:prstClr val="black">
-                      <a:alpha val="30000"/>
-                    </a:prstClr>
-                  </a:outerShdw>
-                </a:effectLst>
-                <a:latin typeface="PT Serif" panose="020A0603040505020204" pitchFamily="18" charset="0"/>
-                <a:cs typeface="Times New Roman" panose="02020603050405020304" pitchFamily="18" charset="0"/>
-              </a:rPr>
-              <a:t>der Banater Schwaben</a:t>
-            </a:r>
-            <a:endParaRPr lang="en-US" sz="1400" b="1" dirty="0">
-              <a:solidFill>
-                <a:srgbClr val="FFE79B"/>
-              </a:solidFill>
-              <a:effectLst>
-                <a:outerShdw blurRad="63500" sx="102000" sy="102000" algn="ctr" rotWithShape="0">
-                  <a:prstClr val="black">
-                    <a:alpha val="30000"/>
-                  </a:prstClr>
-                </a:outerShdw>
-              </a:effectLst>
-              <a:latin typeface="PT Serif" panose="020A0603040505020204" pitchFamily="18" charset="0"/>
-              <a:cs typeface="Times New Roman" panose="02020603050405020304" pitchFamily="18" charset="0"/>
-            </a:endParaRPr>
-          </a:p>
-        </p:txBody>
-      </p:sp>
-      <p:sp>
-        <p:nvSpPr>
-          <p:cNvPr id="23" name="TextBox 22">
-            <a:extLst>
-              <a:ext uri="{FF2B5EF4-FFF2-40B4-BE49-F238E27FC236}">
-                <a16:creationId xmlns:a16="http://schemas.microsoft.com/office/drawing/2014/main" id="{09D957A3-BB6F-A4A0-C746-C7548BF9A99A}"/>
-              </a:ext>
-            </a:extLst>
-          </p:cNvPr>
-          <p:cNvSpPr txBox="1"/>
-          <p:nvPr/>
-        </p:nvSpPr>
-        <p:spPr>
-          <a:xfrm>
-            <a:off x="4589425" y="11637463"/>
-            <a:ext cx="2941542" cy="738664"/>
-          </a:xfrm>
-          <a:prstGeom prst="rect">
-            <a:avLst/>
-          </a:prstGeom>
-          <a:noFill/>
-        </p:spPr>
-        <p:txBody>
-          <a:bodyPr wrap="square" rtlCol="0">
-            <a:spAutoFit/>
-          </a:bodyPr>
-          <a:lstStyle/>
-          <a:p>
-            <a:r>
-              <a:rPr lang="ro-RO" sz="1400" b="1" dirty="0">
-                <a:solidFill>
-                  <a:srgbClr val="FFE79B"/>
-                </a:solidFill>
-                <a:effectLst>
-                  <a:outerShdw blurRad="63500" sx="102000" sy="102000" algn="ctr" rotWithShape="0">
-                    <a:prstClr val="black">
-                      <a:alpha val="30000"/>
-                    </a:prstClr>
-                  </a:outerShdw>
-                </a:effectLst>
-                <a:latin typeface="PT Serif" panose="020A0603040505020204" pitchFamily="18" charset="0"/>
-                <a:cs typeface="Times New Roman" panose="02020603050405020304" pitchFamily="18" charset="0"/>
-              </a:rPr>
-              <a:t>HOG Lovrin</a:t>
-            </a:r>
-          </a:p>
-          <a:p>
-            <a:r>
-              <a:rPr lang="ro-RO" sz="1400" b="1" dirty="0">
-                <a:solidFill>
-                  <a:srgbClr val="FFE79B"/>
-                </a:solidFill>
-                <a:effectLst>
-                  <a:outerShdw blurRad="63500" sx="102000" sy="102000" algn="ctr" rotWithShape="0">
-                    <a:prstClr val="black">
-                      <a:alpha val="30000"/>
-                    </a:prstClr>
-                  </a:outerShdw>
-                </a:effectLst>
-                <a:latin typeface="PT Serif" panose="020A0603040505020204" pitchFamily="18" charset="0"/>
-                <a:cs typeface="Times New Roman" panose="02020603050405020304" pitchFamily="18" charset="0"/>
-              </a:rPr>
-              <a:t>Primăria Lovrin</a:t>
-            </a:r>
-          </a:p>
-          <a:p>
-            <a:r>
-              <a:rPr lang="ro-RO" sz="1400" b="1" dirty="0">
-                <a:solidFill>
-                  <a:srgbClr val="FFE79B"/>
-                </a:solidFill>
-                <a:effectLst>
-                  <a:outerShdw blurRad="63500" sx="102000" sy="102000" algn="ctr" rotWithShape="0">
-                    <a:prstClr val="black">
-                      <a:alpha val="30000"/>
-                    </a:prstClr>
-                  </a:outerShdw>
-                </a:effectLst>
-                <a:latin typeface="PT Serif" panose="020A0603040505020204" pitchFamily="18" charset="0"/>
-                <a:cs typeface="Times New Roman" panose="02020603050405020304" pitchFamily="18" charset="0"/>
-              </a:rPr>
-              <a:t>Parohia Romano-Catolică Lovrin</a:t>
-            </a:r>
-            <a:endParaRPr lang="en-US" sz="1400" b="1" dirty="0">
-              <a:solidFill>
-                <a:srgbClr val="FFE79B"/>
-              </a:solidFill>
-              <a:effectLst>
-                <a:outerShdw blurRad="63500" sx="102000" sy="102000" algn="ctr" rotWithShape="0">
-                  <a:prstClr val="black">
-                    <a:alpha val="30000"/>
-                  </a:prstClr>
-                </a:outerShdw>
-              </a:effectLst>
-              <a:latin typeface="PT Serif" panose="020A0603040505020204" pitchFamily="18" charset="0"/>
-              <a:cs typeface="Times New Roman" panose="02020603050405020304" pitchFamily="18" charset="0"/>
-            </a:endParaRPr>
-          </a:p>
-        </p:txBody>
-      </p:sp>
-      <p:sp>
-        <p:nvSpPr>
-          <p:cNvPr id="24" name="TextBox 23">
-            <a:extLst>
-              <a:ext uri="{FF2B5EF4-FFF2-40B4-BE49-F238E27FC236}">
-                <a16:creationId xmlns:a16="http://schemas.microsoft.com/office/drawing/2014/main" id="{233D4F82-CD46-952B-9BCD-2B62D6F5BED1}"/>
-              </a:ext>
-            </a:extLst>
-          </p:cNvPr>
-          <p:cNvSpPr txBox="1"/>
-          <p:nvPr/>
-        </p:nvSpPr>
-        <p:spPr>
-          <a:xfrm>
-            <a:off x="7467668" y="11637463"/>
-            <a:ext cx="1901495" cy="738664"/>
-          </a:xfrm>
-          <a:prstGeom prst="rect">
-            <a:avLst/>
-          </a:prstGeom>
-          <a:noFill/>
-        </p:spPr>
-        <p:txBody>
-          <a:bodyPr wrap="square" rtlCol="0">
-            <a:spAutoFit/>
-          </a:bodyPr>
-          <a:lstStyle/>
-          <a:p>
-            <a:r>
-              <a:rPr lang="ro-RO" sz="1400" b="1" dirty="0">
-                <a:solidFill>
-                  <a:srgbClr val="FFE79B"/>
-                </a:solidFill>
-                <a:effectLst>
-                  <a:outerShdw blurRad="63500" sx="102000" sy="102000" algn="ctr" rotWithShape="0">
-                    <a:prstClr val="black">
-                      <a:alpha val="30000"/>
-                    </a:prstClr>
-                  </a:outerShdw>
-                </a:effectLst>
-                <a:latin typeface="PT Serif" panose="020A0603040505020204" pitchFamily="18" charset="0"/>
-                <a:ea typeface="Tahoma" panose="020B0604030504040204" pitchFamily="34" charset="0"/>
-                <a:cs typeface="Times New Roman" panose="02020603050405020304" pitchFamily="18" charset="0"/>
-              </a:rPr>
-              <a:t>Demokratisches Forum der Deutschen im Banat</a:t>
-            </a:r>
-          </a:p>
-        </p:txBody>
-      </p:sp>
-      <p:sp>
-        <p:nvSpPr>
-          <p:cNvPr id="2" name="TextBox 1">
-            <a:extLst>
-              <a:ext uri="{FF2B5EF4-FFF2-40B4-BE49-F238E27FC236}">
-                <a16:creationId xmlns:a16="http://schemas.microsoft.com/office/drawing/2014/main" id="{121E178F-7137-815E-641E-B54FDDA0A449}"/>
-              </a:ext>
-            </a:extLst>
-          </p:cNvPr>
-          <p:cNvSpPr txBox="1"/>
-          <p:nvPr/>
-        </p:nvSpPr>
-        <p:spPr>
-          <a:xfrm>
-            <a:off x="425426" y="6871141"/>
-            <a:ext cx="10231682" cy="3170099"/>
-          </a:xfrm>
-          <a:prstGeom prst="rect">
-            <a:avLst/>
-          </a:prstGeom>
-          <a:noFill/>
-          <a:effectLst/>
-        </p:spPr>
-        <p:txBody>
-          <a:bodyPr wrap="square" rtlCol="0">
-            <a:spAutoFit/>
-          </a:bodyPr>
-          <a:lstStyle/>
-          <a:p>
-            <a:r>
-              <a:rPr lang="ro-RO" sz="20000" dirty="0">
-                <a:solidFill>
-                  <a:srgbClr val="FFE79B"/>
-                </a:solidFill>
-                <a:effectLst>
-                  <a:outerShdw blurRad="63500" sx="102000" sy="102000" algn="ctr" rotWithShape="0">
-                    <a:prstClr val="black">
-                      <a:alpha val="30000"/>
-                    </a:prstClr>
-                  </a:outerShdw>
-                </a:effectLst>
-                <a:latin typeface="Deutsch-Gotisch" pitchFamily="50" charset="0"/>
-                <a:cs typeface="Times New Roman" panose="02020603050405020304" pitchFamily="18" charset="0"/>
-              </a:rPr>
-              <a:t>Kerweih</a:t>
-            </a:r>
-            <a:endParaRPr lang="en-US" sz="20000" dirty="0">
-              <a:solidFill>
-                <a:srgbClr val="FFE79B"/>
-              </a:solidFill>
-              <a:effectLst>
-                <a:outerShdw blurRad="63500" sx="102000" sy="102000" algn="ctr" rotWithShape="0">
-                  <a:prstClr val="black">
-                    <a:alpha val="30000"/>
-                  </a:prstClr>
-                </a:outerShdw>
-              </a:effectLst>
-              <a:latin typeface="Deutsch-Gotisch" pitchFamily="50" charset="0"/>
-              <a:cs typeface="Times New Roman" panose="02020603050405020304" pitchFamily="18" charset="0"/>
-            </a:endParaRPr>
-          </a:p>
-        </p:txBody>
-      </p:sp>
-      <p:sp>
-        <p:nvSpPr>
-          <p:cNvPr id="3" name="TextBox 2">
-            <a:extLst>
-              <a:ext uri="{FF2B5EF4-FFF2-40B4-BE49-F238E27FC236}">
-                <a16:creationId xmlns:a16="http://schemas.microsoft.com/office/drawing/2014/main" id="{A147DE8D-D8E3-41A3-E1BF-0395310EA1EB}"/>
-              </a:ext>
-            </a:extLst>
-          </p:cNvPr>
-          <p:cNvSpPr txBox="1"/>
-          <p:nvPr/>
-        </p:nvSpPr>
-        <p:spPr>
-          <a:xfrm>
-            <a:off x="1896197" y="6673544"/>
-            <a:ext cx="10231682" cy="1323439"/>
-          </a:xfrm>
-          <a:prstGeom prst="rect">
-            <a:avLst/>
-          </a:prstGeom>
-          <a:noFill/>
-        </p:spPr>
-        <p:txBody>
-          <a:bodyPr wrap="square" rtlCol="0">
-            <a:spAutoFit/>
-          </a:bodyPr>
-          <a:lstStyle/>
-          <a:p>
-            <a:r>
-              <a:rPr lang="ro-RO" sz="8000" dirty="0">
-                <a:solidFill>
-                  <a:srgbClr val="FFE79B"/>
-                </a:solidFill>
-                <a:effectLst>
-                  <a:outerShdw blurRad="63500" sx="102000" sy="102000" algn="ctr" rotWithShape="0">
-                    <a:prstClr val="black">
-                      <a:alpha val="30000"/>
-                    </a:prstClr>
-                  </a:outerShdw>
-                </a:effectLst>
-                <a:latin typeface="Deutsch-Gotisch" pitchFamily="50" charset="0"/>
-                <a:cs typeface="Times New Roman" panose="02020603050405020304" pitchFamily="18" charset="0"/>
-              </a:rPr>
-              <a:t>Lowriner</a:t>
-            </a:r>
-            <a:endParaRPr lang="en-US" sz="8000" dirty="0">
-              <a:solidFill>
-                <a:srgbClr val="FFE79B"/>
-              </a:solidFill>
-              <a:effectLst>
-                <a:outerShdw blurRad="63500" sx="102000" sy="102000" algn="ctr" rotWithShape="0">
-                  <a:prstClr val="black">
-                    <a:alpha val="30000"/>
-                  </a:prstClr>
-                </a:outerShdw>
-              </a:effectLst>
-              <a:latin typeface="Deutsch-Gotisch" pitchFamily="50" charset="0"/>
-              <a:cs typeface="Times New Roman" panose="02020603050405020304" pitchFamily="18" charset="0"/>
-            </a:endParaRPr>
-          </a:p>
-        </p:txBody>
-      </p:sp>
-      <p:sp>
-        <p:nvSpPr>
-          <p:cNvPr id="4" name="TextBox 3">
-            <a:extLst>
-              <a:ext uri="{FF2B5EF4-FFF2-40B4-BE49-F238E27FC236}">
-                <a16:creationId xmlns:a16="http://schemas.microsoft.com/office/drawing/2014/main" id="{9A3CA178-BB23-CF5F-2705-2C8213C273DF}"/>
-              </a:ext>
-            </a:extLst>
-          </p:cNvPr>
-          <p:cNvSpPr txBox="1"/>
-          <p:nvPr/>
-        </p:nvSpPr>
-        <p:spPr>
-          <a:xfrm>
-            <a:off x="4365785" y="9504750"/>
-            <a:ext cx="5875495" cy="923330"/>
-          </a:xfrm>
-          <a:prstGeom prst="rect">
-            <a:avLst/>
-          </a:prstGeom>
-          <a:noFill/>
-        </p:spPr>
-        <p:txBody>
-          <a:bodyPr wrap="square" rtlCol="0">
-            <a:spAutoFit/>
-          </a:bodyPr>
-          <a:lstStyle/>
-          <a:p>
-            <a:r>
-              <a:rPr lang="ro-RO" sz="5400" dirty="0">
-                <a:solidFill>
-                  <a:srgbClr val="FFE79B"/>
-                </a:solidFill>
-                <a:effectLst>
-                  <a:outerShdw blurRad="63500" sx="102000" sy="102000" algn="ctr" rotWithShape="0">
-                    <a:prstClr val="black">
-                      <a:alpha val="30000"/>
-                    </a:prstClr>
-                  </a:outerShdw>
-                </a:effectLst>
-                <a:latin typeface="Deutsch-Gotisch" pitchFamily="50" charset="0"/>
-                <a:cs typeface="Times New Roman" panose="02020603050405020304" pitchFamily="18" charset="0"/>
-              </a:rPr>
-              <a:t>03.08.2024</a:t>
-            </a:r>
-            <a:endParaRPr lang="en-US" sz="5400" dirty="0">
-              <a:solidFill>
-                <a:srgbClr val="FFE79B"/>
-              </a:solidFill>
-              <a:effectLst>
-                <a:outerShdw blurRad="63500" sx="102000" sy="102000" algn="ctr" rotWithShape="0">
-                  <a:prstClr val="black">
-                    <a:alpha val="30000"/>
-                  </a:prstClr>
-                </a:outerShdw>
-              </a:effectLst>
-              <a:latin typeface="Deutsch-Gotisch" pitchFamily="50" charset="0"/>
-              <a:cs typeface="Times New Roman" panose="02020603050405020304" pitchFamily="18" charset="0"/>
-            </a:endParaRPr>
-          </a:p>
-        </p:txBody>
-      </p:sp>
-      <p:sp>
-        <p:nvSpPr>
-          <p:cNvPr id="5" name="TextBox 4">
-            <a:extLst>
-              <a:ext uri="{FF2B5EF4-FFF2-40B4-BE49-F238E27FC236}">
-                <a16:creationId xmlns:a16="http://schemas.microsoft.com/office/drawing/2014/main" id="{42A0CE11-CF25-C229-BC3A-9624216A6CCF}"/>
-              </a:ext>
-            </a:extLst>
-          </p:cNvPr>
-          <p:cNvSpPr txBox="1"/>
-          <p:nvPr/>
-        </p:nvSpPr>
-        <p:spPr>
-          <a:xfrm>
-            <a:off x="665849" y="4802352"/>
-            <a:ext cx="10231682" cy="553998"/>
+            <a:off x="876859" y="5467770"/>
+            <a:ext cx="4015792" cy="553998"/>
           </a:xfrm>
           <a:prstGeom prst="rect">
             <a:avLst/>
@@ -3836,31 +3670,34 @@
                 <a:latin typeface="PT Serif" panose="020A0603040505020204" pitchFamily="18" charset="0"/>
                 <a:cs typeface="Times New Roman" panose="02020603050405020304" pitchFamily="18" charset="0"/>
               </a:rPr>
-              <a:t>Căminul Cultural Lovrin</a:t>
-            </a:r>
-            <a:endParaRPr lang="en-US" sz="3000" b="1" dirty="0">
-              <a:solidFill>
-                <a:srgbClr val="FFE79B"/>
-              </a:solidFill>
-              <a:effectLst>
-                <a:outerShdw blurRad="63500" sx="102000" sy="102000" algn="ctr" rotWithShape="0">
-                  <a:prstClr val="black">
-                    <a:alpha val="30000"/>
-                  </a:prstClr>
-                </a:outerShdw>
-              </a:effectLst>
-              <a:latin typeface="PT Serif" panose="020A0603040505020204" pitchFamily="18" charset="0"/>
-              <a:cs typeface="Times New Roman" panose="02020603050405020304" pitchFamily="18" charset="0"/>
-            </a:endParaRPr>
+              <a:t>Ora 19:</a:t>
+            </a:r>
+            <a:r>
+              <a:rPr lang="en-US" sz="3000" b="1" dirty="0">
+                <a:solidFill>
+                  <a:srgbClr val="FFE79B"/>
+                </a:solidFill>
+                <a:effectLst>
+                  <a:outerShdw blurRad="63500" sx="102000" sy="102000" algn="ctr" rotWithShape="0">
+                    <a:prstClr val="black">
+                      <a:alpha val="30000"/>
+                    </a:prstClr>
+                  </a:outerShdw>
+                </a:effectLst>
+                <a:latin typeface="PT Serif" panose="020A0603040505020204" pitchFamily="18" charset="0"/>
+                <a:cs typeface="Times New Roman" panose="02020603050405020304" pitchFamily="18" charset="0"/>
+              </a:rPr>
+              <a:t>00</a:t>
+            </a:r>
           </a:p>
         </p:txBody>
       </p:sp>
       <p:pic>
         <p:nvPicPr>
-          <p:cNvPr id="9" name="Picture 8">
+          <p:cNvPr id="14" name="Picture 13">
             <a:extLst>
               <a:ext uri="{FF2B5EF4-FFF2-40B4-BE49-F238E27FC236}">
-                <a16:creationId xmlns:a16="http://schemas.microsoft.com/office/drawing/2014/main" id="{96981860-2647-7091-FCA6-8CC423EB8B85}"/>
+                <a16:creationId xmlns:a16="http://schemas.microsoft.com/office/drawing/2014/main" id="{4056D17A-0D62-E5D8-EF23-4CDBCA59C713}"/>
               </a:ext>
             </a:extLst>
           </p:cNvPr>
@@ -3882,140 +3719,6 @@
           </a:stretch>
         </p:blipFill>
         <p:spPr>
-          <a:xfrm>
-            <a:off x="91897" y="4796764"/>
-            <a:ext cx="553998" cy="553998"/>
-          </a:xfrm>
-          <a:prstGeom prst="rect">
-            <a:avLst/>
-          </a:prstGeom>
-        </p:spPr>
-      </p:pic>
-      <p:pic>
-        <p:nvPicPr>
-          <p:cNvPr id="11" name="Picture 10">
-            <a:extLst>
-              <a:ext uri="{FF2B5EF4-FFF2-40B4-BE49-F238E27FC236}">
-                <a16:creationId xmlns:a16="http://schemas.microsoft.com/office/drawing/2014/main" id="{8BC1E183-DCAB-B394-1579-F8BA67B627C7}"/>
-              </a:ext>
-            </a:extLst>
-          </p:cNvPr>
-          <p:cNvPicPr>
-            <a:picLocks noChangeAspect="1"/>
-          </p:cNvPicPr>
-          <p:nvPr/>
-        </p:nvPicPr>
-        <p:blipFill>
-          <a:blip r:embed="rId6">
-            <a:extLst>
-              <a:ext uri="{28A0092B-C50C-407E-A947-70E740481C1C}">
-                <a14:useLocalDpi xmlns:a14="http://schemas.microsoft.com/office/drawing/2010/main" val="0"/>
-              </a:ext>
-            </a:extLst>
-          </a:blip>
-          <a:stretch>
-            <a:fillRect/>
-          </a:stretch>
-        </p:blipFill>
-        <p:spPr>
-          <a:xfrm>
-            <a:off x="149451" y="5532352"/>
-            <a:ext cx="438027" cy="438027"/>
-          </a:xfrm>
-          <a:prstGeom prst="rect">
-            <a:avLst/>
-          </a:prstGeom>
-        </p:spPr>
-      </p:pic>
-      <p:sp>
-        <p:nvSpPr>
-          <p:cNvPr id="12" name="TextBox 11">
-            <a:extLst>
-              <a:ext uri="{FF2B5EF4-FFF2-40B4-BE49-F238E27FC236}">
-                <a16:creationId xmlns:a16="http://schemas.microsoft.com/office/drawing/2014/main" id="{7BADC1A9-C904-5E13-73C6-2D00701B5690}"/>
-              </a:ext>
-            </a:extLst>
-          </p:cNvPr>
-          <p:cNvSpPr txBox="1"/>
-          <p:nvPr/>
-        </p:nvSpPr>
-        <p:spPr>
-          <a:xfrm>
-            <a:off x="665849" y="5467770"/>
-            <a:ext cx="4015792" cy="553998"/>
-          </a:xfrm>
-          <a:prstGeom prst="rect">
-            <a:avLst/>
-          </a:prstGeom>
-          <a:noFill/>
-        </p:spPr>
-        <p:txBody>
-          <a:bodyPr wrap="square" rtlCol="0">
-            <a:spAutoFit/>
-          </a:bodyPr>
-          <a:lstStyle/>
-          <a:p>
-            <a:r>
-              <a:rPr lang="ro-RO" sz="3000" b="1" dirty="0">
-                <a:solidFill>
-                  <a:srgbClr val="FFE79B"/>
-                </a:solidFill>
-                <a:effectLst>
-                  <a:outerShdw blurRad="63500" sx="102000" sy="102000" algn="ctr" rotWithShape="0">
-                    <a:prstClr val="black">
-                      <a:alpha val="30000"/>
-                    </a:prstClr>
-                  </a:outerShdw>
-                </a:effectLst>
-                <a:latin typeface="PT Serif" panose="020A0603040505020204" pitchFamily="18" charset="0"/>
-                <a:cs typeface="Times New Roman" panose="02020603050405020304" pitchFamily="18" charset="0"/>
-              </a:rPr>
-              <a:t>Ora 19:00 - 19:00 Uhr</a:t>
-            </a:r>
-            <a:endParaRPr lang="en-US" sz="3000" b="1" dirty="0">
-              <a:solidFill>
-                <a:srgbClr val="FFE79B"/>
-              </a:solidFill>
-              <a:effectLst>
-                <a:outerShdw blurRad="63500" sx="102000" sy="102000" algn="ctr" rotWithShape="0">
-                  <a:prstClr val="black">
-                    <a:alpha val="30000"/>
-                  </a:prstClr>
-                </a:outerShdw>
-              </a:effectLst>
-              <a:latin typeface="PT Serif" panose="020A0603040505020204" pitchFamily="18" charset="0"/>
-              <a:cs typeface="Times New Roman" panose="02020603050405020304" pitchFamily="18" charset="0"/>
-            </a:endParaRPr>
-          </a:p>
-        </p:txBody>
-      </p:sp>
-      <p:pic>
-        <p:nvPicPr>
-          <p:cNvPr id="14" name="Picture 13">
-            <a:extLst>
-              <a:ext uri="{FF2B5EF4-FFF2-40B4-BE49-F238E27FC236}">
-                <a16:creationId xmlns:a16="http://schemas.microsoft.com/office/drawing/2014/main" id="{4056D17A-0D62-E5D8-EF23-4CDBCA59C713}"/>
-              </a:ext>
-            </a:extLst>
-          </p:cNvPr>
-          <p:cNvPicPr>
-            <a:picLocks noChangeAspect="1"/>
-          </p:cNvPicPr>
-          <p:nvPr/>
-        </p:nvPicPr>
-        <p:blipFill>
-          <a:blip r:embed="rId7">
-            <a:extLst>
-              <a:ext uri="{28A0092B-C50C-407E-A947-70E740481C1C}">
-                <a14:useLocalDpi xmlns:a14="http://schemas.microsoft.com/office/drawing/2010/main" val="0"/>
-              </a:ext>
-            </a:extLst>
-          </a:blip>
-          <a:stretch>
-            <a:fillRect/>
-          </a:stretch>
-        </p:blipFill>
-        <p:spPr>
           <a:xfrm rot="1060458">
             <a:off x="798678" y="23082"/>
             <a:ext cx="889046" cy="889046"/>
@@ -4025,6 +3728,563 @@
           </a:prstGeom>
         </p:spPr>
       </p:pic>
+      <p:grpSp>
+        <p:nvGrpSpPr>
+          <p:cNvPr id="37" name="Group 36">
+            <a:extLst>
+              <a:ext uri="{FF2B5EF4-FFF2-40B4-BE49-F238E27FC236}">
+                <a16:creationId xmlns:a16="http://schemas.microsoft.com/office/drawing/2014/main" id="{8F17E71A-0CD2-E013-7256-9ADBB7EBE5E2}"/>
+              </a:ext>
+            </a:extLst>
+          </p:cNvPr>
+          <p:cNvGrpSpPr/>
+          <p:nvPr/>
+        </p:nvGrpSpPr>
+        <p:grpSpPr>
+          <a:xfrm>
+            <a:off x="-441929" y="10964725"/>
+            <a:ext cx="10040559" cy="1422663"/>
+            <a:chOff x="-441929" y="10964725"/>
+            <a:chExt cx="10040559" cy="1422663"/>
+          </a:xfrm>
+        </p:grpSpPr>
+        <p:grpSp>
+          <p:nvGrpSpPr>
+            <p:cNvPr id="8" name="Group 7">
+              <a:extLst>
+                <a:ext uri="{FF2B5EF4-FFF2-40B4-BE49-F238E27FC236}">
+                  <a16:creationId xmlns:a16="http://schemas.microsoft.com/office/drawing/2014/main" id="{06F618A7-E93F-E8F5-41CA-F8B4073D16BE}"/>
+                </a:ext>
+              </a:extLst>
+            </p:cNvPr>
+            <p:cNvGrpSpPr/>
+            <p:nvPr/>
+          </p:nvGrpSpPr>
+          <p:grpSpPr>
+            <a:xfrm>
+              <a:off x="4327658" y="11114943"/>
+              <a:ext cx="3071928" cy="1272445"/>
+              <a:chOff x="3264636" y="12444961"/>
+              <a:chExt cx="3071928" cy="1272445"/>
+            </a:xfrm>
+          </p:grpSpPr>
+          <p:pic>
+            <p:nvPicPr>
+              <p:cNvPr id="20" name="Picture 19">
+                <a:extLst>
+                  <a:ext uri="{FF2B5EF4-FFF2-40B4-BE49-F238E27FC236}">
+                    <a16:creationId xmlns:a16="http://schemas.microsoft.com/office/drawing/2014/main" id="{D3360B39-7EC2-ABEA-7AD5-92D6455E0BC9}"/>
+                  </a:ext>
+                </a:extLst>
+              </p:cNvPr>
+              <p:cNvPicPr>
+                <a:picLocks noChangeAspect="1"/>
+              </p:cNvPicPr>
+              <p:nvPr/>
+            </p:nvPicPr>
+            <p:blipFill>
+              <a:blip r:embed="rId6">
+                <a:extLst>
+                  <a:ext uri="{28A0092B-C50C-407E-A947-70E740481C1C}">
+                    <a14:useLocalDpi xmlns:a14="http://schemas.microsoft.com/office/drawing/2010/main" val="0"/>
+                  </a:ext>
+                </a:extLst>
+              </a:blip>
+              <a:stretch>
+                <a:fillRect/>
+              </a:stretch>
+            </p:blipFill>
+            <p:spPr>
+              <a:xfrm>
+                <a:off x="4398264" y="12444961"/>
+                <a:ext cx="804672" cy="804672"/>
+              </a:xfrm>
+              <a:prstGeom prst="rect">
+                <a:avLst/>
+              </a:prstGeom>
+            </p:spPr>
+          </p:pic>
+          <p:sp>
+            <p:nvSpPr>
+              <p:cNvPr id="22" name="TextBox 21">
+                <a:extLst>
+                  <a:ext uri="{FF2B5EF4-FFF2-40B4-BE49-F238E27FC236}">
+                    <a16:creationId xmlns:a16="http://schemas.microsoft.com/office/drawing/2014/main" id="{BC3B032A-6D24-1F6C-98B1-4FA81D958E00}"/>
+                  </a:ext>
+                </a:extLst>
+              </p:cNvPr>
+              <p:cNvSpPr txBox="1"/>
+              <p:nvPr/>
+            </p:nvSpPr>
+            <p:spPr>
+              <a:xfrm>
+                <a:off x="3264636" y="13286519"/>
+                <a:ext cx="3071928" cy="430887"/>
+              </a:xfrm>
+              <a:prstGeom prst="rect">
+                <a:avLst/>
+              </a:prstGeom>
+              <a:noFill/>
+            </p:spPr>
+            <p:txBody>
+              <a:bodyPr wrap="square" rtlCol="0">
+                <a:spAutoFit/>
+              </a:bodyPr>
+              <a:lstStyle/>
+              <a:p>
+                <a:pPr algn="ctr"/>
+                <a:r>
+                  <a:rPr lang="ro-RO" sz="1100" dirty="0">
+                    <a:solidFill>
+                      <a:srgbClr val="FFE79B"/>
+                    </a:solidFill>
+                    <a:effectLst>
+                      <a:outerShdw blurRad="63500" sx="102000" sy="102000" algn="ctr" rotWithShape="0">
+                        <a:prstClr val="black">
+                          <a:alpha val="30000"/>
+                        </a:prstClr>
+                      </a:outerShdw>
+                    </a:effectLst>
+                    <a:latin typeface="PT Serif" panose="020A0603040505020204" pitchFamily="18" charset="0"/>
+                    <a:cs typeface="Times New Roman" panose="02020603050405020304" pitchFamily="18" charset="0"/>
+                  </a:rPr>
+                  <a:t>HOG</a:t>
+                </a:r>
+                <a:r>
+                  <a:rPr lang="de-DE" sz="1100" dirty="0">
+                    <a:solidFill>
+                      <a:srgbClr val="FFE79B"/>
+                    </a:solidFill>
+                    <a:effectLst>
+                      <a:outerShdw blurRad="63500" sx="102000" sy="102000" algn="ctr" rotWithShape="0">
+                        <a:prstClr val="black">
+                          <a:alpha val="30000"/>
+                        </a:prstClr>
+                      </a:outerShdw>
+                    </a:effectLst>
+                    <a:latin typeface="PT Serif" panose="020A0603040505020204" pitchFamily="18" charset="0"/>
+                    <a:cs typeface="Times New Roman" panose="02020603050405020304" pitchFamily="18" charset="0"/>
+                  </a:rPr>
+                  <a:t> Lovrin</a:t>
+                </a:r>
+                <a:r>
+                  <a:rPr lang="ro-RO" sz="1100" dirty="0">
+                    <a:solidFill>
+                      <a:srgbClr val="FFE79B"/>
+                    </a:solidFill>
+                    <a:effectLst>
+                      <a:outerShdw blurRad="63500" sx="102000" sy="102000" algn="ctr" rotWithShape="0">
+                        <a:prstClr val="black">
+                          <a:alpha val="30000"/>
+                        </a:prstClr>
+                      </a:outerShdw>
+                    </a:effectLst>
+                    <a:latin typeface="PT Serif" panose="020A0603040505020204" pitchFamily="18" charset="0"/>
+                    <a:cs typeface="Times New Roman" panose="02020603050405020304" pitchFamily="18" charset="0"/>
+                  </a:rPr>
+                  <a:t> </a:t>
+                </a:r>
+                <a:r>
+                  <a:rPr lang="de-DE" sz="1100" dirty="0">
+                    <a:solidFill>
+                      <a:srgbClr val="FFE79B"/>
+                    </a:solidFill>
+                    <a:effectLst>
+                      <a:outerShdw blurRad="63500" sx="102000" sy="102000" algn="ctr" rotWithShape="0">
+                        <a:prstClr val="black">
+                          <a:alpha val="30000"/>
+                        </a:prstClr>
+                      </a:outerShdw>
+                    </a:effectLst>
+                    <a:latin typeface="PT Serif" panose="020A0603040505020204" pitchFamily="18" charset="0"/>
+                    <a:cs typeface="Times New Roman" panose="02020603050405020304" pitchFamily="18" charset="0"/>
+                  </a:rPr>
+                  <a:t>in der Landsmannschaft</a:t>
+                </a:r>
+              </a:p>
+              <a:p>
+                <a:pPr algn="ctr"/>
+                <a:r>
+                  <a:rPr lang="de-DE" sz="1100" dirty="0">
+                    <a:solidFill>
+                      <a:srgbClr val="FFE79B"/>
+                    </a:solidFill>
+                    <a:effectLst>
+                      <a:outerShdw blurRad="63500" sx="102000" sy="102000" algn="ctr" rotWithShape="0">
+                        <a:prstClr val="black">
+                          <a:alpha val="30000"/>
+                        </a:prstClr>
+                      </a:outerShdw>
+                    </a:effectLst>
+                    <a:latin typeface="PT Serif" panose="020A0603040505020204" pitchFamily="18" charset="0"/>
+                    <a:cs typeface="Times New Roman" panose="02020603050405020304" pitchFamily="18" charset="0"/>
+                  </a:rPr>
+                  <a:t>der Banater Schwaben</a:t>
+                </a:r>
+              </a:p>
+            </p:txBody>
+          </p:sp>
+        </p:grpSp>
+        <p:grpSp>
+          <p:nvGrpSpPr>
+            <p:cNvPr id="7" name="Group 6">
+              <a:extLst>
+                <a:ext uri="{FF2B5EF4-FFF2-40B4-BE49-F238E27FC236}">
+                  <a16:creationId xmlns:a16="http://schemas.microsoft.com/office/drawing/2014/main" id="{8E8E7A91-00DD-DD9C-6DEE-9EEC37D72948}"/>
+                </a:ext>
+              </a:extLst>
+            </p:cNvPr>
+            <p:cNvGrpSpPr/>
+            <p:nvPr/>
+          </p:nvGrpSpPr>
+          <p:grpSpPr>
+            <a:xfrm>
+              <a:off x="2480476" y="10964725"/>
+              <a:ext cx="1971983" cy="1418822"/>
+              <a:chOff x="3814608" y="12072914"/>
+              <a:chExt cx="1971983" cy="1418822"/>
+            </a:xfrm>
+          </p:grpSpPr>
+          <p:pic>
+            <p:nvPicPr>
+              <p:cNvPr id="18" name="Picture 17">
+                <a:extLst>
+                  <a:ext uri="{FF2B5EF4-FFF2-40B4-BE49-F238E27FC236}">
+                    <a16:creationId xmlns:a16="http://schemas.microsoft.com/office/drawing/2014/main" id="{2E6DE1C6-BB1D-E360-A587-2CC859F542E6}"/>
+                  </a:ext>
+                </a:extLst>
+              </p:cNvPr>
+              <p:cNvPicPr>
+                <a:picLocks noChangeAspect="1"/>
+              </p:cNvPicPr>
+              <p:nvPr/>
+            </p:nvPicPr>
+            <p:blipFill>
+              <a:blip r:embed="rId7">
+                <a:extLst>
+                  <a:ext uri="{28A0092B-C50C-407E-A947-70E740481C1C}">
+                    <a14:useLocalDpi xmlns:a14="http://schemas.microsoft.com/office/drawing/2010/main" val="0"/>
+                  </a:ext>
+                </a:extLst>
+              </a:blip>
+              <a:stretch>
+                <a:fillRect/>
+              </a:stretch>
+            </p:blipFill>
+            <p:spPr>
+              <a:xfrm>
+                <a:off x="4398264" y="12072914"/>
+                <a:ext cx="804672" cy="988825"/>
+              </a:xfrm>
+              <a:prstGeom prst="rect">
+                <a:avLst/>
+              </a:prstGeom>
+            </p:spPr>
+          </p:pic>
+          <p:sp>
+            <p:nvSpPr>
+              <p:cNvPr id="23" name="TextBox 22">
+                <a:extLst>
+                  <a:ext uri="{FF2B5EF4-FFF2-40B4-BE49-F238E27FC236}">
+                    <a16:creationId xmlns:a16="http://schemas.microsoft.com/office/drawing/2014/main" id="{09D957A3-BB6F-A4A0-C746-C7548BF9A99A}"/>
+                  </a:ext>
+                </a:extLst>
+              </p:cNvPr>
+              <p:cNvSpPr txBox="1"/>
+              <p:nvPr/>
+            </p:nvSpPr>
+            <p:spPr>
+              <a:xfrm>
+                <a:off x="3814608" y="13060849"/>
+                <a:ext cx="1971983" cy="430887"/>
+              </a:xfrm>
+              <a:prstGeom prst="rect">
+                <a:avLst/>
+              </a:prstGeom>
+              <a:noFill/>
+            </p:spPr>
+            <p:txBody>
+              <a:bodyPr wrap="square" rtlCol="0">
+                <a:spAutoFit/>
+              </a:bodyPr>
+              <a:lstStyle/>
+              <a:p>
+                <a:pPr algn="ctr"/>
+                <a:r>
+                  <a:rPr lang="ro-RO" sz="1100" dirty="0">
+                    <a:solidFill>
+                      <a:srgbClr val="FFE79B"/>
+                    </a:solidFill>
+                    <a:effectLst>
+                      <a:outerShdw blurRad="63500" sx="102000" sy="102000" algn="ctr" rotWithShape="0">
+                        <a:prstClr val="black">
+                          <a:alpha val="30000"/>
+                        </a:prstClr>
+                      </a:outerShdw>
+                    </a:effectLst>
+                    <a:latin typeface="PT Serif" panose="020A0603040505020204" pitchFamily="18" charset="0"/>
+                    <a:cs typeface="Times New Roman" panose="02020603050405020304" pitchFamily="18" charset="0"/>
+                  </a:rPr>
+                  <a:t>Primăria Lovrin</a:t>
+                </a:r>
+              </a:p>
+              <a:p>
+                <a:pPr algn="ctr"/>
+                <a:r>
+                  <a:rPr lang="ro-RO" sz="1100" dirty="0">
+                    <a:solidFill>
+                      <a:srgbClr val="FFE79B"/>
+                    </a:solidFill>
+                    <a:effectLst>
+                      <a:outerShdw blurRad="63500" sx="102000" sy="102000" algn="ctr" rotWithShape="0">
+                        <a:prstClr val="black">
+                          <a:alpha val="30000"/>
+                        </a:prstClr>
+                      </a:outerShdw>
+                    </a:effectLst>
+                    <a:latin typeface="PT Serif" panose="020A0603040505020204" pitchFamily="18" charset="0"/>
+                    <a:cs typeface="Times New Roman" panose="02020603050405020304" pitchFamily="18" charset="0"/>
+                  </a:rPr>
+                  <a:t>Consiliul Local Lovrin</a:t>
+                </a:r>
+              </a:p>
+            </p:txBody>
+          </p:sp>
+        </p:grpSp>
+        <p:grpSp>
+          <p:nvGrpSpPr>
+            <p:cNvPr id="16" name="Group 15">
+              <a:extLst>
+                <a:ext uri="{FF2B5EF4-FFF2-40B4-BE49-F238E27FC236}">
+                  <a16:creationId xmlns:a16="http://schemas.microsoft.com/office/drawing/2014/main" id="{E8A58787-34A9-6648-CF4B-83392C3E5C0B}"/>
+                </a:ext>
+              </a:extLst>
+            </p:cNvPr>
+            <p:cNvGrpSpPr/>
+            <p:nvPr/>
+          </p:nvGrpSpPr>
+          <p:grpSpPr>
+            <a:xfrm>
+              <a:off x="-441929" y="11022365"/>
+              <a:ext cx="3370979" cy="1364586"/>
+              <a:chOff x="3264636" y="10711346"/>
+              <a:chExt cx="3370980" cy="1364586"/>
+            </a:xfrm>
+          </p:grpSpPr>
+          <p:pic>
+            <p:nvPicPr>
+              <p:cNvPr id="13" name="Picture 12">
+                <a:extLst>
+                  <a:ext uri="{FF2B5EF4-FFF2-40B4-BE49-F238E27FC236}">
+                    <a16:creationId xmlns:a16="http://schemas.microsoft.com/office/drawing/2014/main" id="{47462F58-A5B1-235A-8A2B-5941BDF1BBEA}"/>
+                  </a:ext>
+                </a:extLst>
+              </p:cNvPr>
+              <p:cNvPicPr>
+                <a:picLocks noChangeAspect="1"/>
+              </p:cNvPicPr>
+              <p:nvPr/>
+            </p:nvPicPr>
+            <p:blipFill>
+              <a:blip r:embed="rId8">
+                <a:extLst>
+                  <a:ext uri="{28A0092B-C50C-407E-A947-70E740481C1C}">
+                    <a14:useLocalDpi xmlns:a14="http://schemas.microsoft.com/office/drawing/2010/main" val="0"/>
+                  </a:ext>
+                </a:extLst>
+              </a:blip>
+              <a:stretch>
+                <a:fillRect/>
+              </a:stretch>
+            </p:blipFill>
+            <p:spPr>
+              <a:xfrm>
+                <a:off x="4518236" y="10711346"/>
+                <a:ext cx="875845" cy="875845"/>
+              </a:xfrm>
+              <a:prstGeom prst="rect">
+                <a:avLst/>
+              </a:prstGeom>
+            </p:spPr>
+          </p:pic>
+          <p:sp>
+            <p:nvSpPr>
+              <p:cNvPr id="15" name="TextBox 14">
+                <a:extLst>
+                  <a:ext uri="{FF2B5EF4-FFF2-40B4-BE49-F238E27FC236}">
+                    <a16:creationId xmlns:a16="http://schemas.microsoft.com/office/drawing/2014/main" id="{8E5ECDB8-E3C0-1DF9-D771-B99F64334EAA}"/>
+                  </a:ext>
+                </a:extLst>
+              </p:cNvPr>
+              <p:cNvSpPr txBox="1"/>
+              <p:nvPr/>
+            </p:nvSpPr>
+            <p:spPr>
+              <a:xfrm>
+                <a:off x="3264636" y="11645045"/>
+                <a:ext cx="3370980" cy="430887"/>
+              </a:xfrm>
+              <a:prstGeom prst="rect">
+                <a:avLst/>
+              </a:prstGeom>
+              <a:noFill/>
+            </p:spPr>
+            <p:txBody>
+              <a:bodyPr wrap="square" rtlCol="0">
+                <a:spAutoFit/>
+              </a:bodyPr>
+              <a:lstStyle/>
+              <a:p>
+                <a:pPr algn="ctr"/>
+                <a:r>
+                  <a:rPr lang="ro-RO" sz="1100" dirty="0">
+                    <a:solidFill>
+                      <a:srgbClr val="FFE79B"/>
+                    </a:solidFill>
+                    <a:effectLst>
+                      <a:outerShdw blurRad="63500" sx="102000" sy="102000" algn="ctr" rotWithShape="0">
+                        <a:prstClr val="black">
+                          <a:alpha val="30000"/>
+                        </a:prstClr>
+                      </a:outerShdw>
+                    </a:effectLst>
+                    <a:latin typeface="PT Serif" panose="020A0603040505020204" pitchFamily="18" charset="0"/>
+                    <a:cs typeface="Times New Roman" panose="02020603050405020304" pitchFamily="18" charset="0"/>
+                  </a:rPr>
+                  <a:t>Episcopia Rom.-Cat. Timișoara</a:t>
+                </a:r>
+              </a:p>
+              <a:p>
+                <a:pPr algn="ctr"/>
+                <a:r>
+                  <a:rPr lang="ro-RO" sz="1100" dirty="0">
+                    <a:solidFill>
+                      <a:srgbClr val="FFE79B"/>
+                    </a:solidFill>
+                    <a:effectLst>
+                      <a:outerShdw blurRad="63500" sx="102000" sy="102000" algn="ctr" rotWithShape="0">
+                        <a:prstClr val="black">
+                          <a:alpha val="30000"/>
+                        </a:prstClr>
+                      </a:outerShdw>
+                    </a:effectLst>
+                    <a:latin typeface="PT Serif" panose="020A0603040505020204" pitchFamily="18" charset="0"/>
+                    <a:cs typeface="Times New Roman" panose="02020603050405020304" pitchFamily="18" charset="0"/>
+                  </a:rPr>
+                  <a:t>Parohia Rom.-Cat. Lovrin</a:t>
+                </a:r>
+              </a:p>
+            </p:txBody>
+          </p:sp>
+        </p:grpSp>
+        <p:grpSp>
+          <p:nvGrpSpPr>
+            <p:cNvPr id="31" name="Group 30">
+              <a:extLst>
+                <a:ext uri="{FF2B5EF4-FFF2-40B4-BE49-F238E27FC236}">
+                  <a16:creationId xmlns:a16="http://schemas.microsoft.com/office/drawing/2014/main" id="{35BD2B1F-D63B-4615-C255-F3D8B1AB46E3}"/>
+                </a:ext>
+              </a:extLst>
+            </p:cNvPr>
+            <p:cNvGrpSpPr/>
+            <p:nvPr/>
+          </p:nvGrpSpPr>
+          <p:grpSpPr>
+            <a:xfrm>
+              <a:off x="7349825" y="11125689"/>
+              <a:ext cx="2248805" cy="1260701"/>
+              <a:chOff x="6502145" y="11109245"/>
+              <a:chExt cx="2248805" cy="1260701"/>
+            </a:xfrm>
+          </p:grpSpPr>
+          <p:sp>
+            <p:nvSpPr>
+              <p:cNvPr id="24" name="TextBox 23">
+                <a:extLst>
+                  <a:ext uri="{FF2B5EF4-FFF2-40B4-BE49-F238E27FC236}">
+                    <a16:creationId xmlns:a16="http://schemas.microsoft.com/office/drawing/2014/main" id="{233D4F82-CD46-952B-9BCD-2B62D6F5BED1}"/>
+                  </a:ext>
+                </a:extLst>
+              </p:cNvPr>
+              <p:cNvSpPr txBox="1"/>
+              <p:nvPr/>
+            </p:nvSpPr>
+            <p:spPr>
+              <a:xfrm>
+                <a:off x="6502145" y="11939059"/>
+                <a:ext cx="2248805" cy="430887"/>
+              </a:xfrm>
+              <a:prstGeom prst="rect">
+                <a:avLst/>
+              </a:prstGeom>
+              <a:noFill/>
+            </p:spPr>
+            <p:txBody>
+              <a:bodyPr wrap="square" rtlCol="0">
+                <a:spAutoFit/>
+              </a:bodyPr>
+              <a:lstStyle/>
+              <a:p>
+                <a:pPr algn="ctr"/>
+                <a:r>
+                  <a:rPr lang="ro-RO" sz="1100" dirty="0">
+                    <a:solidFill>
+                      <a:srgbClr val="FFE79B"/>
+                    </a:solidFill>
+                    <a:effectLst>
+                      <a:outerShdw blurRad="63500" sx="102000" sy="102000" algn="ctr" rotWithShape="0">
+                        <a:prstClr val="black">
+                          <a:alpha val="30000"/>
+                        </a:prstClr>
+                      </a:outerShdw>
+                    </a:effectLst>
+                    <a:latin typeface="PT Serif" panose="020A0603040505020204" pitchFamily="18" charset="0"/>
+                    <a:ea typeface="Tahoma" panose="020B0604030504040204" pitchFamily="34" charset="0"/>
+                    <a:cs typeface="Times New Roman" panose="02020603050405020304" pitchFamily="18" charset="0"/>
+                  </a:rPr>
+                  <a:t>Demokratisches Forum der Deutschen im Banat</a:t>
+                </a:r>
+              </a:p>
+            </p:txBody>
+          </p:sp>
+          <p:pic>
+            <p:nvPicPr>
+              <p:cNvPr id="30" name="Picture 29">
+                <a:extLst>
+                  <a:ext uri="{FF2B5EF4-FFF2-40B4-BE49-F238E27FC236}">
+                    <a16:creationId xmlns:a16="http://schemas.microsoft.com/office/drawing/2014/main" id="{6D49677A-FA65-0FA9-C4B2-9AEADCC1CA66}"/>
+                  </a:ext>
+                </a:extLst>
+              </p:cNvPr>
+              <p:cNvPicPr>
+                <a:picLocks noChangeAspect="1"/>
+              </p:cNvPicPr>
+              <p:nvPr/>
+            </p:nvPicPr>
+            <p:blipFill>
+              <a:blip r:embed="rId9">
+                <a:extLst>
+                  <a:ext uri="{28A0092B-C50C-407E-A947-70E740481C1C}">
+                    <a14:useLocalDpi xmlns:a14="http://schemas.microsoft.com/office/drawing/2010/main" val="0"/>
+                  </a:ext>
+                </a:extLst>
+              </a:blip>
+              <a:stretch>
+                <a:fillRect/>
+              </a:stretch>
+            </p:blipFill>
+            <p:spPr>
+              <a:xfrm>
+                <a:off x="7256698" y="11109245"/>
+                <a:ext cx="755422" cy="755422"/>
+              </a:xfrm>
+              <a:prstGeom prst="rect">
+                <a:avLst/>
+              </a:prstGeom>
+            </p:spPr>
+          </p:pic>
+        </p:grpSp>
+      </p:grpSp>
     </p:spTree>
     <p:extLst>
       <p:ext uri="{BB962C8B-B14F-4D97-AF65-F5344CB8AC3E}">

</xml_diff>